<commit_message>
Made lots of changes
git-svn-id: http://gforge.soe.ucsc.edu/svn/scheduling115/trunk@210 24d622c1-b139-487c-8c47-8fc189a5de26
</commit_message>
<xml_diff>
--- a/docs/design/Flow diagram.pptx
+++ b/docs/design/Flow diagram.pptx
@@ -290,7 +290,7 @@
             <a:fld id="{37B5A10D-57DA-4CA5-AEBB-C50A90A5B500}" type="datetimeFigureOut">
               <a:rPr lang="en-US" smtClean="0"/>
               <a:pPr/>
-              <a:t>11/7/2010</a:t>
+              <a:t>11/17/2010</a:t>
             </a:fld>
             <a:endParaRPr lang="en-US"/>
           </a:p>
@@ -457,7 +457,7 @@
             <a:fld id="{37B5A10D-57DA-4CA5-AEBB-C50A90A5B500}" type="datetimeFigureOut">
               <a:rPr lang="en-US" smtClean="0"/>
               <a:pPr/>
-              <a:t>11/7/2010</a:t>
+              <a:t>11/17/2010</a:t>
             </a:fld>
             <a:endParaRPr lang="en-US"/>
           </a:p>
@@ -634,7 +634,7 @@
             <a:fld id="{37B5A10D-57DA-4CA5-AEBB-C50A90A5B500}" type="datetimeFigureOut">
               <a:rPr lang="en-US" smtClean="0"/>
               <a:pPr/>
-              <a:t>11/7/2010</a:t>
+              <a:t>11/17/2010</a:t>
             </a:fld>
             <a:endParaRPr lang="en-US"/>
           </a:p>
@@ -801,7 +801,7 @@
             <a:fld id="{37B5A10D-57DA-4CA5-AEBB-C50A90A5B500}" type="datetimeFigureOut">
               <a:rPr lang="en-US" smtClean="0"/>
               <a:pPr/>
-              <a:t>11/7/2010</a:t>
+              <a:t>11/17/2010</a:t>
             </a:fld>
             <a:endParaRPr lang="en-US"/>
           </a:p>
@@ -1044,7 +1044,7 @@
             <a:fld id="{37B5A10D-57DA-4CA5-AEBB-C50A90A5B500}" type="datetimeFigureOut">
               <a:rPr lang="en-US" smtClean="0"/>
               <a:pPr/>
-              <a:t>11/7/2010</a:t>
+              <a:t>11/17/2010</a:t>
             </a:fld>
             <a:endParaRPr lang="en-US"/>
           </a:p>
@@ -1329,7 +1329,7 @@
             <a:fld id="{37B5A10D-57DA-4CA5-AEBB-C50A90A5B500}" type="datetimeFigureOut">
               <a:rPr lang="en-US" smtClean="0"/>
               <a:pPr/>
-              <a:t>11/7/2010</a:t>
+              <a:t>11/17/2010</a:t>
             </a:fld>
             <a:endParaRPr lang="en-US"/>
           </a:p>
@@ -1748,7 +1748,7 @@
             <a:fld id="{37B5A10D-57DA-4CA5-AEBB-C50A90A5B500}" type="datetimeFigureOut">
               <a:rPr lang="en-US" smtClean="0"/>
               <a:pPr/>
-              <a:t>11/7/2010</a:t>
+              <a:t>11/17/2010</a:t>
             </a:fld>
             <a:endParaRPr lang="en-US"/>
           </a:p>
@@ -1863,7 +1863,7 @@
             <a:fld id="{37B5A10D-57DA-4CA5-AEBB-C50A90A5B500}" type="datetimeFigureOut">
               <a:rPr lang="en-US" smtClean="0"/>
               <a:pPr/>
-              <a:t>11/7/2010</a:t>
+              <a:t>11/17/2010</a:t>
             </a:fld>
             <a:endParaRPr lang="en-US"/>
           </a:p>
@@ -1955,7 +1955,7 @@
             <a:fld id="{37B5A10D-57DA-4CA5-AEBB-C50A90A5B500}" type="datetimeFigureOut">
               <a:rPr lang="en-US" smtClean="0"/>
               <a:pPr/>
-              <a:t>11/7/2010</a:t>
+              <a:t>11/17/2010</a:t>
             </a:fld>
             <a:endParaRPr lang="en-US"/>
           </a:p>
@@ -2229,7 +2229,7 @@
             <a:fld id="{37B5A10D-57DA-4CA5-AEBB-C50A90A5B500}" type="datetimeFigureOut">
               <a:rPr lang="en-US" smtClean="0"/>
               <a:pPr/>
-              <a:t>11/7/2010</a:t>
+              <a:t>11/17/2010</a:t>
             </a:fld>
             <a:endParaRPr lang="en-US"/>
           </a:p>
@@ -2479,7 +2479,7 @@
             <a:fld id="{37B5A10D-57DA-4CA5-AEBB-C50A90A5B500}" type="datetimeFigureOut">
               <a:rPr lang="en-US" smtClean="0"/>
               <a:pPr/>
-              <a:t>11/7/2010</a:t>
+              <a:t>11/17/2010</a:t>
             </a:fld>
             <a:endParaRPr lang="en-US"/>
           </a:p>
@@ -2689,7 +2689,7 @@
             <a:fld id="{37B5A10D-57DA-4CA5-AEBB-C50A90A5B500}" type="datetimeFigureOut">
               <a:rPr lang="en-US" smtClean="0"/>
               <a:pPr/>
-              <a:t>11/7/2010</a:t>
+              <a:t>11/17/2010</a:t>
             </a:fld>
             <a:endParaRPr lang="en-US"/>
           </a:p>
@@ -3065,14 +3065,14 @@
           <p:cNvPr id="11" name="Elbow Connector 10"/>
           <p:cNvCxnSpPr>
             <a:stCxn id="4" idx="4"/>
-            <a:endCxn id="5" idx="0"/>
+            <a:endCxn id="9" idx="0"/>
           </p:cNvCxnSpPr>
           <p:nvPr/>
         </p:nvCxnSpPr>
         <p:spPr>
           <a:xfrm rot="16200000" flipH="1">
-            <a:off x="3276600" y="1905000"/>
-            <a:ext cx="2362200" cy="76200"/>
+            <a:off x="2914650" y="2266950"/>
+            <a:ext cx="3124200" cy="114300"/>
           </a:xfrm>
           <a:prstGeom prst="bentConnector3">
             <a:avLst>

</xml_diff>